<commit_message>
Editted the powerpoint slightly
</commit_message>
<xml_diff>
--- a/Presentation/Grub Grabber.pptx
+++ b/Presentation/Grub Grabber.pptx
@@ -223,7 +223,7 @@
           <a:p>
             <a:fld id="{DA380F1E-03E0-4293-A013-C0635E00A1D8}" type="datetimeFigureOut">
               <a:rPr lang="en-GB" smtClean="0"/>
-              <a:t>24/02/2015</a:t>
+              <a:t>25/02/2015</a:t>
             </a:fld>
             <a:endParaRPr lang="en-GB" dirty="0"/>
           </a:p>
@@ -2084,7 +2084,7 @@
           <a:p>
             <a:fld id="{C3FF6CE6-259D-4872-A5CA-E08A0AC05CD2}" type="datetimeFigureOut">
               <a:rPr lang="en-GB" smtClean="0"/>
-              <a:t>24/02/2015</a:t>
+              <a:t>25/02/2015</a:t>
             </a:fld>
             <a:endParaRPr lang="en-GB" dirty="0"/>
           </a:p>
@@ -2249,7 +2249,7 @@
           <a:p>
             <a:fld id="{C3FF6CE6-259D-4872-A5CA-E08A0AC05CD2}" type="datetimeFigureOut">
               <a:rPr lang="en-GB" smtClean="0"/>
-              <a:t>24/02/2015</a:t>
+              <a:t>25/02/2015</a:t>
             </a:fld>
             <a:endParaRPr lang="en-GB" dirty="0"/>
           </a:p>
@@ -2424,7 +2424,7 @@
           <a:p>
             <a:fld id="{C3FF6CE6-259D-4872-A5CA-E08A0AC05CD2}" type="datetimeFigureOut">
               <a:rPr lang="en-GB" smtClean="0"/>
-              <a:t>24/02/2015</a:t>
+              <a:t>25/02/2015</a:t>
             </a:fld>
             <a:endParaRPr lang="en-GB" dirty="0"/>
           </a:p>
@@ -2589,7 +2589,7 @@
           <a:p>
             <a:fld id="{C3FF6CE6-259D-4872-A5CA-E08A0AC05CD2}" type="datetimeFigureOut">
               <a:rPr lang="en-GB" smtClean="0"/>
-              <a:t>24/02/2015</a:t>
+              <a:t>25/02/2015</a:t>
             </a:fld>
             <a:endParaRPr lang="en-GB" dirty="0"/>
           </a:p>
@@ -2830,7 +2830,7 @@
           <a:p>
             <a:fld id="{C3FF6CE6-259D-4872-A5CA-E08A0AC05CD2}" type="datetimeFigureOut">
               <a:rPr lang="en-GB" smtClean="0"/>
-              <a:t>24/02/2015</a:t>
+              <a:t>25/02/2015</a:t>
             </a:fld>
             <a:endParaRPr lang="en-GB" dirty="0"/>
           </a:p>
@@ -3113,7 +3113,7 @@
           <a:p>
             <a:fld id="{C3FF6CE6-259D-4872-A5CA-E08A0AC05CD2}" type="datetimeFigureOut">
               <a:rPr lang="en-GB" smtClean="0"/>
-              <a:t>24/02/2015</a:t>
+              <a:t>25/02/2015</a:t>
             </a:fld>
             <a:endParaRPr lang="en-GB" dirty="0"/>
           </a:p>
@@ -3530,7 +3530,7 @@
           <a:p>
             <a:fld id="{C3FF6CE6-259D-4872-A5CA-E08A0AC05CD2}" type="datetimeFigureOut">
               <a:rPr lang="en-GB" smtClean="0"/>
-              <a:t>24/02/2015</a:t>
+              <a:t>25/02/2015</a:t>
             </a:fld>
             <a:endParaRPr lang="en-GB" dirty="0"/>
           </a:p>
@@ -3643,7 +3643,7 @@
           <a:p>
             <a:fld id="{C3FF6CE6-259D-4872-A5CA-E08A0AC05CD2}" type="datetimeFigureOut">
               <a:rPr lang="en-GB" smtClean="0"/>
-              <a:t>24/02/2015</a:t>
+              <a:t>25/02/2015</a:t>
             </a:fld>
             <a:endParaRPr lang="en-GB" dirty="0"/>
           </a:p>
@@ -3733,7 +3733,7 @@
           <a:p>
             <a:fld id="{C3FF6CE6-259D-4872-A5CA-E08A0AC05CD2}" type="datetimeFigureOut">
               <a:rPr lang="en-GB" smtClean="0"/>
-              <a:t>24/02/2015</a:t>
+              <a:t>25/02/2015</a:t>
             </a:fld>
             <a:endParaRPr lang="en-GB" dirty="0"/>
           </a:p>
@@ -4005,7 +4005,7 @@
           <a:p>
             <a:fld id="{C3FF6CE6-259D-4872-A5CA-E08A0AC05CD2}" type="datetimeFigureOut">
               <a:rPr lang="en-GB" smtClean="0"/>
-              <a:t>24/02/2015</a:t>
+              <a:t>25/02/2015</a:t>
             </a:fld>
             <a:endParaRPr lang="en-GB" dirty="0"/>
           </a:p>
@@ -4253,7 +4253,7 @@
           <a:p>
             <a:fld id="{C3FF6CE6-259D-4872-A5CA-E08A0AC05CD2}" type="datetimeFigureOut">
               <a:rPr lang="en-GB" smtClean="0"/>
-              <a:t>24/02/2015</a:t>
+              <a:t>25/02/2015</a:t>
             </a:fld>
             <a:endParaRPr lang="en-GB" dirty="0"/>
           </a:p>
@@ -4461,7 +4461,7 @@
           <a:p>
             <a:fld id="{C3FF6CE6-259D-4872-A5CA-E08A0AC05CD2}" type="datetimeFigureOut">
               <a:rPr lang="en-GB" smtClean="0"/>
-              <a:t>24/02/2015</a:t>
+              <a:t>25/02/2015</a:t>
             </a:fld>
             <a:endParaRPr lang="en-GB" dirty="0"/>
           </a:p>
@@ -4885,11 +4885,7 @@
           <a:p>
             <a:r>
               <a:rPr lang="en-GB" dirty="0" smtClean="0"/>
-              <a:t>Isaac </a:t>
-            </a:r>
-            <a:r>
-              <a:rPr lang="en-GB" dirty="0" smtClean="0"/>
-              <a:t>Jordan - 2080466J, </a:t>
+              <a:t>Isaac Jordan - 2080466J, </a:t>
             </a:r>
           </a:p>
           <a:p>
@@ -4905,16 +4901,11 @@
               <a:rPr lang="en-GB" dirty="0" smtClean="0"/>
               <a:t> - 2062685C,</a:t>
             </a:r>
-            <a:endParaRPr lang="en-GB" dirty="0" smtClean="0"/>
           </a:p>
           <a:p>
             <a:r>
               <a:rPr lang="en-GB" dirty="0" smtClean="0"/>
-              <a:t>Callum </a:t>
-            </a:r>
-            <a:r>
-              <a:rPr lang="en-GB" dirty="0" smtClean="0"/>
-              <a:t>Nixon – 2072704N, </a:t>
+              <a:t>Callum Nixon – 2072704N, </a:t>
             </a:r>
           </a:p>
           <a:p>
@@ -4926,11 +4917,7 @@
           <a:p>
             <a:r>
               <a:rPr lang="en-GB" dirty="0" smtClean="0"/>
-              <a:t>Group </a:t>
-            </a:r>
-            <a:r>
-              <a:rPr lang="en-GB" dirty="0" smtClean="0"/>
-              <a:t>A4</a:t>
+              <a:t>Group A4</a:t>
             </a:r>
             <a:endParaRPr lang="en-GB" dirty="0"/>
           </a:p>
@@ -7886,15 +7873,7 @@
           <a:p>
             <a:r>
               <a:rPr lang="en-GB" dirty="0"/>
-              <a:t>“I love a cheeky </a:t>
-            </a:r>
-            <a:r>
-              <a:rPr lang="en-GB" dirty="0"/>
-              <a:t>Nandos</a:t>
-            </a:r>
-            <a:r>
-              <a:rPr lang="en-GB" dirty="0"/>
-              <a:t>”</a:t>
+              <a:t>“I love a cheeky Nandos”</a:t>
             </a:r>
           </a:p>
         </p:txBody>
@@ -8424,7 +8403,15 @@
           <a:p>
             <a:r>
               <a:rPr lang="en-GB" dirty="0"/>
-              <a:t>Recommends places based on ratings and location in relation to </a:t>
+              <a:t>Recommends </a:t>
+            </a:r>
+            <a:r>
+              <a:rPr lang="en-GB" dirty="0" smtClean="0"/>
+              <a:t>food vendors based </a:t>
+            </a:r>
+            <a:r>
+              <a:rPr lang="en-GB" dirty="0"/>
+              <a:t>on ratings and location in relation to </a:t>
             </a:r>
             <a:r>
               <a:rPr lang="en-GB" dirty="0" smtClean="0"/>
@@ -8435,7 +8422,15 @@
           <a:p>
             <a:r>
               <a:rPr lang="en-GB" dirty="0"/>
-              <a:t>Gives information on the recommended place based on Google Maps API (reviews, </a:t>
+              <a:t>Gives information on the recommended </a:t>
+            </a:r>
+            <a:r>
+              <a:rPr lang="en-GB" dirty="0" smtClean="0"/>
+              <a:t>vendor based </a:t>
+            </a:r>
+            <a:r>
+              <a:rPr lang="en-GB" dirty="0"/>
+              <a:t>on Google Maps API (reviews, </a:t>
             </a:r>
             <a:r>
               <a:rPr lang="en-GB" dirty="0" smtClean="0"/>
@@ -8454,7 +8449,15 @@
             </a:r>
             <a:r>
               <a:rPr lang="en-GB" dirty="0"/>
-              <a:t>made by the user in order to make sure places they don’t like don't come up again, and that they don't get the same places </a:t>
+              <a:t>made by the user in order to make sure </a:t>
+            </a:r>
+            <a:r>
+              <a:rPr lang="en-GB" dirty="0" smtClean="0"/>
+              <a:t>vendors they don’t </a:t>
+            </a:r>
+            <a:r>
+              <a:rPr lang="en-GB" dirty="0"/>
+              <a:t>like don't come up again, and that they don't get the same places </a:t>
             </a:r>
             <a:r>
               <a:rPr lang="en-GB" dirty="0" smtClean="0"/>
@@ -8548,11 +8551,7 @@
           <a:p>
             <a:r>
               <a:rPr lang="en-GB" dirty="0" smtClean="0"/>
-              <a:t>Specification - </a:t>
-            </a:r>
-            <a:r>
-              <a:rPr lang="en-GB" dirty="0" err="1" smtClean="0"/>
-              <a:t>MoSCoW</a:t>
+              <a:t>Specification - MoSCoW</a:t>
             </a:r>
             <a:endParaRPr lang="en-GB" dirty="0"/>
           </a:p>

</xml_diff>

<commit_message>
Created all the views and url skeletons as defined in design documents, and made the empty html templates to match
</commit_message>
<xml_diff>
--- a/Presentation/Grub Grabber.pptx
+++ b/Presentation/Grub Grabber.pptx
@@ -4891,15 +4891,7 @@
           <a:p>
             <a:r>
               <a:rPr lang="en-GB" dirty="0" smtClean="0"/>
-              <a:t>Jack </a:t>
-            </a:r>
-            <a:r>
-              <a:rPr lang="en-GB" dirty="0" err="1" smtClean="0"/>
-              <a:t>Croal</a:t>
-            </a:r>
-            <a:r>
-              <a:rPr lang="en-GB" dirty="0" smtClean="0"/>
-              <a:t> - 2062685C,</a:t>
+              <a:t>Jack Croal - 2062685C,</a:t>
             </a:r>
           </a:p>
           <a:p>
@@ -7805,7 +7797,11 @@
           <a:p>
             <a:r>
               <a:rPr lang="en-GB" dirty="0" smtClean="0"/>
-              <a:t>Persona – Steven Jacobs</a:t>
+              <a:t>Persona – </a:t>
+            </a:r>
+            <a:r>
+              <a:rPr lang="en-GB" dirty="0" smtClean="0"/>
+              <a:t>Steven Jacobs</a:t>
             </a:r>
             <a:endParaRPr lang="en-GB" dirty="0"/>
           </a:p>
@@ -8567,14 +8563,14 @@
             <p:ph idx="1"/>
             <p:extLst>
               <p:ext uri="{D42A27DB-BD31-4B8C-83A1-F6EECF244321}">
-                <p14:modId xmlns:p14="http://schemas.microsoft.com/office/powerpoint/2010/main" val="788016736"/>
+                <p14:modId xmlns:p14="http://schemas.microsoft.com/office/powerpoint/2010/main" val="2812522164"/>
               </p:ext>
             </p:extLst>
           </p:nvPr>
         </p:nvGraphicFramePr>
         <p:xfrm>
           <a:off x="179512" y="1139037"/>
-          <a:ext cx="8784976" cy="5660627"/>
+          <a:ext cx="8784976" cy="5600672"/>
         </p:xfrm>
         <a:graphic>
           <a:graphicData uri="http://schemas.openxmlformats.org/drawingml/2006/table">
@@ -8853,7 +8849,50 @@
                           <a:ea typeface="+mn-ea"/>
                           <a:cs typeface="+mn-cs"/>
                         </a:rPr>
-                        <a:t>Take into account what other people have rated</a:t>
+                        <a:t>Provide automatic scheduled emails for recommendations</a:t>
+                      </a:r>
+                    </a:p>
+                    <a:p>
+                      <a:pPr marL="285750" marR="0" lvl="0" indent="-285750" algn="l" defTabSz="914400" rtl="0" eaLnBrk="1" fontAlgn="auto" latinLnBrk="0" hangingPunct="1">
+                        <a:lnSpc>
+                          <a:spcPct val="100000"/>
+                        </a:lnSpc>
+                        <a:spcBef>
+                          <a:spcPts val="0"/>
+                        </a:spcBef>
+                        <a:spcAft>
+                          <a:spcPts val="0"/>
+                        </a:spcAft>
+                        <a:buClrTx/>
+                        <a:buSzTx/>
+                        <a:buFont typeface="Arial" panose="020B0604020202020204" pitchFamily="34" charset="0"/>
+                        <a:buChar char="•"/>
+                        <a:tabLst/>
+                        <a:defRPr/>
+                      </a:pPr>
+                      <a:r>
+                        <a:rPr lang="en-GB" sz="1800" kern="1200" dirty="0" smtClean="0">
+                          <a:solidFill>
+                            <a:schemeClr val="dk1"/>
+                          </a:solidFill>
+                          <a:effectLst/>
+                          <a:latin typeface="+mn-lt"/>
+                          <a:ea typeface="+mn-ea"/>
+                          <a:cs typeface="+mn-cs"/>
+                        </a:rPr>
+                        <a:t>Take </a:t>
+                      </a:r>
+                      <a:r>
+                        <a:rPr lang="en-GB" sz="1800" kern="1200" dirty="0" smtClean="0">
+                          <a:solidFill>
+                            <a:schemeClr val="dk1"/>
+                          </a:solidFill>
+                          <a:effectLst/>
+                          <a:latin typeface="+mn-lt"/>
+                          <a:ea typeface="+mn-ea"/>
+                          <a:cs typeface="+mn-cs"/>
+                        </a:rPr>
+                        <a:t>into account what other people have rated</a:t>
                       </a:r>
                     </a:p>
                     <a:p>
@@ -9023,10 +9062,20 @@
                           <a:ea typeface="+mn-ea"/>
                           <a:cs typeface="+mn-cs"/>
                         </a:rPr>
-                        <a:t>Retrieve location using GPS or IP</a:t>
+                        <a:t>Retrieve location using GPS or </a:t>
                       </a:r>
-                    </a:p>
-                    <a:p>
+                      <a:r>
+                        <a:rPr lang="en-GB" sz="1800" kern="1200" dirty="0" smtClean="0">
+                          <a:solidFill>
+                            <a:schemeClr val="dk1"/>
+                          </a:solidFill>
+                          <a:effectLst/>
+                          <a:latin typeface="+mn-lt"/>
+                          <a:ea typeface="+mn-ea"/>
+                          <a:cs typeface="+mn-cs"/>
+                        </a:rPr>
+                        <a:t>IP</a:t>
+                      </a:r>
                       <a:endParaRPr lang="en-GB" dirty="0"/>
                     </a:p>
                   </a:txBody>

</xml_diff>